<commit_message>
Fix code style issue: use parentheses instead of backslash for line continuation
Co-authored-by: AnthonyNMassaad <125673864+AnthonyNMassaad@users.noreply.github.com>
</commit_message>
<xml_diff>
--- a/presentation/Texas_Holdem_Ultron_Presentation.pptx
+++ b/presentation/Texas_Holdem_Ultron_Presentation.pptx
@@ -5022,11 +5022,11 @@
             </a:r>
             <a:br/>
             <a:r>
-              <a:t>                loss = pg_loss - self.config.ent_coef * entropy_loss \</a:t>
-            </a:r>
-            <a:br/>
-            <a:r>
-              <a:t>                       + self.config.vf_coef * v_loss</a:t>
+              <a:t>                loss = (pg_loss - self.config.ent_coef * entropy_loss</a:t>
+            </a:r>
+            <a:br/>
+            <a:r>
+              <a:t>                        + self.config.vf_coef * v_loss)</a:t>
             </a:r>
             <a:br/>
             <a:r>

</xml_diff>